<commit_message>
Siva | refactor pptx_generator using strategy pattern
</commit_message>
<xml_diff>
--- a/backend/storage/presentation_1.pptx
+++ b/backend/storage/presentation_1.pptx
@@ -3085,6 +3085,14 @@
 <file path=ppt/slides/slide1.xml><?xml version="1.0" encoding="utf-8"?>
 <p:sld xmlns:a="http://schemas.openxmlformats.org/drawingml/2006/main" xmlns:p="http://schemas.openxmlformats.org/presentationml/2006/main" xmlns:r="http://schemas.openxmlformats.org/officeDocument/2006/relationships">
   <p:cSld>
+    <p:bg>
+      <p:bgPr>
+        <a:solidFill>
+          <a:srgbClr val="FFFFFF"/>
+        </a:solidFill>
+        <a:effectLst/>
+      </p:bgPr>
+    </p:bg>
     <p:spTree>
       <p:nvGrpSpPr>
         <p:cNvPr id="1" name=""/>
@@ -3108,6 +3116,12 @@
           <a:lstStyle/>
           <a:p>
             <a:r>
+              <a:rPr>
+                <a:solidFill>
+                  <a:srgbClr val="000000"/>
+                </a:solidFill>
+                <a:latin typeface="Arial"/>
+              </a:rPr>
               <a:t>FastAPI: Speed and Efficiency for Modern APIs</a:t>
             </a:r>
           </a:p>
@@ -3141,6 +3155,14 @@
 <file path=ppt/slides/slide2.xml><?xml version="1.0" encoding="utf-8"?>
 <p:sld xmlns:a="http://schemas.openxmlformats.org/drawingml/2006/main" xmlns:p="http://schemas.openxmlformats.org/presentationml/2006/main" xmlns:r="http://schemas.openxmlformats.org/officeDocument/2006/relationships">
   <p:cSld>
+    <p:bg>
+      <p:bgPr>
+        <a:solidFill>
+          <a:srgbClr val="FFFFFF"/>
+        </a:solidFill>
+        <a:effectLst/>
+      </p:bgPr>
+    </p:bg>
     <p:spTree>
       <p:nvGrpSpPr>
         <p:cNvPr id="1" name=""/>
@@ -3164,6 +3186,12 @@
           <a:lstStyle/>
           <a:p>
             <a:r>
+              <a:rPr>
+                <a:solidFill>
+                  <a:srgbClr val="000000"/>
+                </a:solidFill>
+                <a:latin typeface="Arial"/>
+              </a:rPr>
               <a:t>Key Advantages of FastAPI</a:t>
             </a:r>
           </a:p>
@@ -3215,6 +3243,14 @@
 <file path=ppt/slides/slide3.xml><?xml version="1.0" encoding="utf-8"?>
 <p:sld xmlns:a="http://schemas.openxmlformats.org/drawingml/2006/main" xmlns:p="http://schemas.openxmlformats.org/presentationml/2006/main" xmlns:r="http://schemas.openxmlformats.org/officeDocument/2006/relationships">
   <p:cSld>
+    <p:bg>
+      <p:bgPr>
+        <a:solidFill>
+          <a:srgbClr val="FFFFFF"/>
+        </a:solidFill>
+        <a:effectLst/>
+      </p:bgPr>
+    </p:bg>
     <p:spTree>
       <p:nvGrpSpPr>
         <p:cNvPr id="1" name=""/>
@@ -3238,6 +3274,12 @@
           <a:lstStyle/>
           <a:p>
             <a:r>
+              <a:rPr>
+                <a:solidFill>
+                  <a:srgbClr val="000000"/>
+                </a:solidFill>
+                <a:latin typeface="Arial"/>
+              </a:rPr>
               <a:t>Comparison with Other Frameworks</a:t>
             </a:r>
           </a:p>
@@ -3300,6 +3342,14 @@
 <file path=ppt/slides/slide4.xml><?xml version="1.0" encoding="utf-8"?>
 <p:sld xmlns:a="http://schemas.openxmlformats.org/drawingml/2006/main" xmlns:p="http://schemas.openxmlformats.org/presentationml/2006/main" xmlns:r="http://schemas.openxmlformats.org/officeDocument/2006/relationships">
   <p:cSld>
+    <p:bg>
+      <p:bgPr>
+        <a:solidFill>
+          <a:srgbClr val="FFFFFF"/>
+        </a:solidFill>
+        <a:effectLst/>
+      </p:bgPr>
+    </p:bg>
     <p:spTree>
       <p:nvGrpSpPr>
         <p:cNvPr id="1" name=""/>
@@ -3323,6 +3373,12 @@
           <a:lstStyle/>
           <a:p>
             <a:r>
+              <a:rPr>
+                <a:solidFill>
+                  <a:srgbClr val="000000"/>
+                </a:solidFill>
+                <a:latin typeface="Arial"/>
+              </a:rPr>
               <a:t>FastAPI Performance Benchmark</a:t>
             </a:r>
           </a:p>
@@ -3376,6 +3432,14 @@
 <file path=ppt/slides/slide5.xml><?xml version="1.0" encoding="utf-8"?>
 <p:sld xmlns:a="http://schemas.openxmlformats.org/drawingml/2006/main" xmlns:p="http://schemas.openxmlformats.org/presentationml/2006/main" xmlns:r="http://schemas.openxmlformats.org/officeDocument/2006/relationships">
   <p:cSld>
+    <p:bg>
+      <p:bgPr>
+        <a:solidFill>
+          <a:srgbClr val="FFFFFF"/>
+        </a:solidFill>
+        <a:effectLst/>
+      </p:bgPr>
+    </p:bg>
     <p:spTree>
       <p:nvGrpSpPr>
         <p:cNvPr id="1" name=""/>
@@ -3399,6 +3463,12 @@
           <a:lstStyle/>
           <a:p>
             <a:r>
+              <a:rPr>
+                <a:solidFill>
+                  <a:srgbClr val="000000"/>
+                </a:solidFill>
+                <a:latin typeface="Arial"/>
+              </a:rPr>
               <a:t>Getting Started with FastAPI</a:t>
             </a:r>
           </a:p>

</xml_diff>